<commit_message>
capstone course: tidying up files.
</commit_message>
<xml_diff>
--- a/eQTL_2D/analysis/update.pptx
+++ b/eQTL_2D/analysis/update.pptx
@@ -3159,7 +3159,11 @@
           <a:p>
             <a:r>
               <a:rPr lang="en-US" dirty="0" smtClean="0"/>
-              <a:t>Systems meeting</a:t>
+              <a:t>Systems </a:t>
+            </a:r>
+            <a:r>
+              <a:rPr lang="en-US" smtClean="0"/>
+              <a:t>Genetics Meeting</a:t>
             </a:r>
             <a:endParaRPr lang="en-US" dirty="0"/>
           </a:p>
@@ -3175,6 +3179,13 @@
   <p:clrMapOvr>
     <a:masterClrMapping/>
   </p:clrMapOvr>
+  <p:timing>
+    <p:tnLst>
+      <p:par>
+        <p:cTn xmlns:p14="http://schemas.microsoft.com/office/powerpoint/2010/main" id="1" dur="indefinite" restart="never" nodeType="tmRoot"/>
+      </p:par>
+    </p:tnLst>
+  </p:timing>
 </p:sld>
 </file>
 
@@ -3290,16 +3301,12 @@
           <a:p>
             <a:pPr lvl="1"/>
             <a:r>
-              <a:rPr lang="en-US" dirty="0" smtClean="0"/>
-              <a:t>Vg / </a:t>
-            </a:r>
-            <a:r>
               <a:rPr lang="en-US" dirty="0" err="1" smtClean="0"/>
               <a:t>Va</a:t>
             </a:r>
             <a:r>
               <a:rPr lang="en-US" dirty="0" smtClean="0"/>
-              <a:t> &lt; 0.6</a:t>
+              <a:t> / Vg &lt; 0.6</a:t>
             </a:r>
           </a:p>
         </p:txBody>
@@ -3314,6 +3321,13 @@
   <p:clrMapOvr>
     <a:masterClrMapping/>
   </p:clrMapOvr>
+  <p:timing>
+    <p:tnLst>
+      <p:par>
+        <p:cTn xmlns:p14="http://schemas.microsoft.com/office/powerpoint/2010/main" id="1" dur="indefinite" restart="never" nodeType="tmRoot"/>
+      </p:par>
+    </p:tnLst>
+  </p:timing>
 </p:sld>
 </file>
 
@@ -3440,6 +3454,13 @@
   <p:clrMapOvr>
     <a:masterClrMapping/>
   </p:clrMapOvr>
+  <p:timing>
+    <p:tnLst>
+      <p:par>
+        <p:cTn xmlns:p14="http://schemas.microsoft.com/office/powerpoint/2010/main" id="1" dur="indefinite" restart="never" nodeType="tmRoot"/>
+      </p:par>
+    </p:tnLst>
+  </p:timing>
 </p:sld>
 </file>
 
@@ -3492,7 +3513,7 @@
           <p:nvPr>
             <p:extLst>
               <p:ext uri="{D42A27DB-BD31-4B8C-83A1-F6EECF244321}">
-                <p14:modId xmlns:p14="http://schemas.microsoft.com/office/powerpoint/2010/main" val="75330939"/>
+                <p14:modId xmlns:p14="http://schemas.microsoft.com/office/powerpoint/2010/main" val="19752863"/>
               </p:ext>
             </p:extLst>
           </p:nvPr>
@@ -3634,7 +3655,7 @@
                       </a:r>
                       <a:r>
                         <a:rPr lang="en-US" b="1" dirty="0" smtClean="0"/>
-                        <a:t> 6</a:t>
+                        <a:t> 19</a:t>
                       </a:r>
                       <a:endParaRPr lang="en-US" dirty="0"/>
                     </a:p>
@@ -3649,12 +3670,16 @@
                     <a:lstStyle/>
                     <a:p>
                       <a:r>
-                        <a:rPr lang="en-US" dirty="0" smtClean="0"/>
-                        <a:t>Vg/</a:t>
-                      </a:r>
-                      <a:r>
                         <a:rPr lang="en-US" dirty="0" err="1" smtClean="0"/>
                         <a:t>Va</a:t>
+                      </a:r>
+                      <a:r>
+                        <a:rPr lang="en-US" dirty="0" smtClean="0"/>
+                        <a:t>/</a:t>
+                      </a:r>
+                      <a:r>
+                        <a:rPr lang="en-US" dirty="0" err="1" smtClean="0"/>
+                        <a:t>Vh</a:t>
                       </a:r>
                       <a:endParaRPr lang="en-US" dirty="0"/>
                     </a:p>
@@ -3738,7 +3763,18 @@
                           <a:ea typeface="+mn-ea"/>
                           <a:cs typeface="+mn-cs"/>
                         </a:rPr>
-                        <a:t>rs7985085 / </a:t>
+                        <a:t>rs2241623</a:t>
+                      </a:r>
+                      <a:r>
+                        <a:rPr lang="en-US" sz="1800" kern="1200" dirty="0" smtClean="0">
+                          <a:solidFill>
+                            <a:schemeClr val="dk1"/>
+                          </a:solidFill>
+                          <a:latin typeface="+mn-lt"/>
+                          <a:ea typeface="+mn-ea"/>
+                          <a:cs typeface="+mn-cs"/>
+                        </a:rPr>
+                        <a:t>/ </a:t>
                       </a:r>
                       <a:r>
                         <a:rPr lang="en-US" sz="1800" b="1" kern="1200" dirty="0" err="1" smtClean="0">
@@ -3760,7 +3796,7 @@
                           <a:ea typeface="+mn-ea"/>
                           <a:cs typeface="+mn-cs"/>
                         </a:rPr>
-                        <a:t> 13 </a:t>
+                        <a:t> 19 </a:t>
                       </a:r>
                       <a:r>
                         <a:rPr lang="en-US" sz="1800" b="0" kern="1200" dirty="0" smtClean="0">
@@ -4148,7 +4184,7 @@
           <p:nvPr>
             <p:extLst>
               <p:ext uri="{D42A27DB-BD31-4B8C-83A1-F6EECF244321}">
-                <p14:modId xmlns:p14="http://schemas.microsoft.com/office/powerpoint/2010/main" val="190937268"/>
+                <p14:modId xmlns:p14="http://schemas.microsoft.com/office/powerpoint/2010/main" val="2359051466"/>
               </p:ext>
             </p:extLst>
           </p:nvPr>
@@ -4282,7 +4318,13 @@
                     <a:p>
                       <a:r>
                         <a:rPr lang="en-US" dirty="0" smtClean="0"/>
-                        <a:t>CHURC1 (FGF Signaling during neural development) /</a:t>
+                        <a:t>CHURC1</a:t>
+                      </a:r>
+                    </a:p>
+                    <a:p>
+                      <a:r>
+                        <a:rPr lang="en-US" dirty="0" smtClean="0"/>
+                        <a:t>(FGF Signaling during neural development) /</a:t>
                       </a:r>
                       <a:r>
                         <a:rPr lang="en-US" baseline="0" dirty="0" smtClean="0"/>
@@ -4305,12 +4347,12 @@
                     <a:lstStyle/>
                     <a:p>
                       <a:r>
-                        <a:rPr lang="en-US" dirty="0" smtClean="0"/>
-                        <a:t>Vg/</a:t>
-                      </a:r>
-                      <a:r>
                         <a:rPr lang="en-US" dirty="0" err="1" smtClean="0"/>
                         <a:t>Va</a:t>
+                      </a:r>
+                      <a:r>
+                        <a:rPr lang="en-US" dirty="0" smtClean="0"/>
+                        <a:t>/Vg</a:t>
                       </a:r>
                       <a:endParaRPr lang="en-US" dirty="0"/>
                     </a:p>
@@ -4451,10 +4493,6 @@
                         </a:rPr>
                         <a:t> 0.22 (0.20)</a:t>
                       </a:r>
-                      <a:endParaRPr lang="en-US" dirty="0" smtClean="0"/>
-                    </a:p>
-                    <a:p>
-                      <a:endParaRPr lang="en-US" dirty="0"/>
                     </a:p>
                   </a:txBody>
                   <a:tcPr/>
@@ -4490,7 +4528,7 @@
                       </a:r>
                       <a:r>
                         <a:rPr lang="en-US" baseline="0" dirty="0" smtClean="0"/>
-                        <a:t> protein) (intron 1)</a:t>
+                        <a:t> protein, not much known function) (intron 1)</a:t>
                       </a:r>
                       <a:endParaRPr lang="en-US" dirty="0"/>
                     </a:p>
@@ -4651,7 +4689,7 @@
                       </a:r>
                       <a:r>
                         <a:rPr lang="en-US" baseline="0" dirty="0" smtClean="0"/>
-                        <a:t> (cell membrane </a:t>
+                        <a:t> (upstream of CHURC1, cell membrane </a:t>
                       </a:r>
                       <a:r>
                         <a:rPr lang="en-US" baseline="0" dirty="0" err="1" smtClean="0"/>

</xml_diff>